<commit_message>
Chapter 6 Worked Problems
Added Worked problems to sections 6.2, 6.3, and 6.4
</commit_message>
<xml_diff>
--- a/Lecture Slides/VideoLectureSlides/6.2.pptx
+++ b/Lecture Slides/VideoLectureSlides/6.2.pptx
@@ -5,7 +5,7 @@
     <p:sldMasterId id="2147483660" r:id="rId4"/>
   </p:sldMasterIdLst>
   <p:notesMasterIdLst>
-    <p:notesMasterId r:id="rId15"/>
+    <p:notesMasterId r:id="rId17"/>
   </p:notesMasterIdLst>
   <p:sldIdLst>
     <p:sldId id="256" r:id="rId5"/>
@@ -18,6 +18,8 @@
     <p:sldId id="296" r:id="rId12"/>
     <p:sldId id="268" r:id="rId13"/>
     <p:sldId id="287" r:id="rId14"/>
+    <p:sldId id="297" r:id="rId15"/>
+    <p:sldId id="298" r:id="rId16"/>
   </p:sldIdLst>
   <p:sldSz cx="9144000" cy="6858000" type="screen4x3"/>
   <p:notesSz cx="6858000" cy="9144000"/>
@@ -231,7 +233,7 @@
           <a:p>
             <a:fld id="{1AA1AB63-216F-4D5B-8811-CCB935E98D4A}" type="datetimeFigureOut">
               <a:rPr lang="en-US" smtClean="0"/>
-              <a:t>6/30/2021</a:t>
+              <a:t>9/20/2021</a:t>
             </a:fld>
             <a:endParaRPr lang="en-US"/>
           </a:p>
@@ -3800,6 +3802,2332 @@
     <p:extLst>
       <p:ext uri="{BB962C8B-B14F-4D97-AF65-F5344CB8AC3E}">
         <p14:creationId xmlns:p14="http://schemas.microsoft.com/office/powerpoint/2010/main" val="3129637585"/>
+      </p:ext>
+    </p:extLst>
+  </p:cSld>
+  <p:clrMapOvr>
+    <a:masterClrMapping/>
+  </p:clrMapOvr>
+</p:sld>
+</file>
+
+<file path=ppt/slides/slide11.xml><?xml version="1.0" encoding="utf-8"?>
+<p:sld xmlns:a="http://schemas.openxmlformats.org/drawingml/2006/main" xmlns:r="http://schemas.openxmlformats.org/officeDocument/2006/relationships" xmlns:p="http://schemas.openxmlformats.org/presentationml/2006/main">
+  <p:cSld>
+    <p:spTree>
+      <p:nvGrpSpPr>
+        <p:cNvPr id="1" name=""/>
+        <p:cNvGrpSpPr/>
+        <p:nvPr/>
+      </p:nvGrpSpPr>
+      <p:grpSpPr>
+        <a:xfrm>
+          <a:off x="0" y="0"/>
+          <a:ext cx="0" cy="0"/>
+          <a:chOff x="0" y="0"/>
+          <a:chExt cx="0" cy="0"/>
+        </a:xfrm>
+      </p:grpSpPr>
+      <p:sp>
+        <p:nvSpPr>
+          <p:cNvPr id="2" name="Title 1">
+            <a:extLst>
+              <a:ext uri="{FF2B5EF4-FFF2-40B4-BE49-F238E27FC236}">
+                <a16:creationId xmlns:a16="http://schemas.microsoft.com/office/drawing/2014/main" id="{9F6878C6-2591-4C7A-93D2-F8B3376DFCE4}"/>
+              </a:ext>
+            </a:extLst>
+          </p:cNvPr>
+          <p:cNvSpPr>
+            <a:spLocks noGrp="1"/>
+          </p:cNvSpPr>
+          <p:nvPr>
+            <p:ph type="title"/>
+          </p:nvPr>
+        </p:nvSpPr>
+        <p:spPr/>
+        <p:txBody>
+          <a:bodyPr/>
+          <a:lstStyle/>
+          <a:p>
+            <a:r>
+              <a:rPr lang="en-US" dirty="0"/>
+              <a:t>Internal Forces Worked Example</a:t>
+            </a:r>
+          </a:p>
+        </p:txBody>
+      </p:sp>
+      <p:sp>
+        <p:nvSpPr>
+          <p:cNvPr id="3" name="Content Placeholder 2">
+            <a:extLst>
+              <a:ext uri="{FF2B5EF4-FFF2-40B4-BE49-F238E27FC236}">
+                <a16:creationId xmlns:a16="http://schemas.microsoft.com/office/drawing/2014/main" id="{DE89A7B7-A3EC-4099-90E1-F492BE222EB6}"/>
+              </a:ext>
+            </a:extLst>
+          </p:cNvPr>
+          <p:cNvSpPr>
+            <a:spLocks noGrp="1"/>
+          </p:cNvSpPr>
+          <p:nvPr>
+            <p:ph idx="1"/>
+          </p:nvPr>
+        </p:nvSpPr>
+        <p:spPr>
+          <a:xfrm>
+            <a:off x="457200" y="1600200"/>
+            <a:ext cx="8229600" cy="1523999"/>
+          </a:xfrm>
+        </p:spPr>
+        <p:txBody>
+          <a:bodyPr>
+            <a:normAutofit fontScale="85000" lnSpcReduction="10000"/>
+          </a:bodyPr>
+          <a:lstStyle/>
+          <a:p>
+            <a:r>
+              <a:rPr lang="en-US" dirty="0"/>
+              <a:t>A mounting bracket with the dimensions shown below is subjected to a 200 lb force. Determine all internal forces and moments at cross section a-a.</a:t>
+            </a:r>
+          </a:p>
+        </p:txBody>
+      </p:sp>
+      <p:sp>
+        <p:nvSpPr>
+          <p:cNvPr id="4" name="Slide Number Placeholder 3">
+            <a:extLst>
+              <a:ext uri="{FF2B5EF4-FFF2-40B4-BE49-F238E27FC236}">
+                <a16:creationId xmlns:a16="http://schemas.microsoft.com/office/drawing/2014/main" id="{B36FD9B8-96EC-4E42-8C34-860B37B9D794}"/>
+              </a:ext>
+            </a:extLst>
+          </p:cNvPr>
+          <p:cNvSpPr>
+            <a:spLocks noGrp="1"/>
+          </p:cNvSpPr>
+          <p:nvPr>
+            <p:ph type="sldNum" sz="quarter" idx="12"/>
+          </p:nvPr>
+        </p:nvSpPr>
+        <p:spPr/>
+        <p:txBody>
+          <a:bodyPr/>
+          <a:lstStyle/>
+          <a:p>
+            <a:fld id="{929262FE-7F58-4A1E-8AF3-5A510A86DEBD}" type="slidenum">
+              <a:rPr lang="en-US" smtClean="0"/>
+              <a:t>11</a:t>
+            </a:fld>
+            <a:endParaRPr lang="en-US"/>
+          </a:p>
+        </p:txBody>
+      </p:sp>
+      <p:grpSp>
+        <p:nvGrpSpPr>
+          <p:cNvPr id="11" name="Group 10">
+            <a:extLst>
+              <a:ext uri="{FF2B5EF4-FFF2-40B4-BE49-F238E27FC236}">
+                <a16:creationId xmlns:a16="http://schemas.microsoft.com/office/drawing/2014/main" id="{EB2DACFD-9893-4B46-9AE2-5323C123C238}"/>
+              </a:ext>
+            </a:extLst>
+          </p:cNvPr>
+          <p:cNvGrpSpPr/>
+          <p:nvPr/>
+        </p:nvGrpSpPr>
+        <p:grpSpPr>
+          <a:xfrm>
+            <a:off x="1390650" y="2859086"/>
+            <a:ext cx="5295900" cy="3497264"/>
+            <a:chOff x="952500" y="2971800"/>
+            <a:chExt cx="5295900" cy="3497264"/>
+          </a:xfrm>
+        </p:grpSpPr>
+        <p:sp>
+          <p:nvSpPr>
+            <p:cNvPr id="6" name="Rectangle: Rounded Corners 5">
+              <a:extLst>
+                <a:ext uri="{FF2B5EF4-FFF2-40B4-BE49-F238E27FC236}">
+                  <a16:creationId xmlns:a16="http://schemas.microsoft.com/office/drawing/2014/main" id="{229FEB10-DF4B-457B-AA2B-43A8190057D2}"/>
+                </a:ext>
+              </a:extLst>
+            </p:cNvPr>
+            <p:cNvSpPr/>
+            <p:nvPr/>
+          </p:nvSpPr>
+          <p:spPr>
+            <a:xfrm>
+              <a:off x="1905000" y="3581400"/>
+              <a:ext cx="3657600" cy="2743200"/>
+            </a:xfrm>
+            <a:prstGeom prst="roundRect">
+              <a:avLst/>
+            </a:prstGeom>
+          </p:spPr>
+          <p:style>
+            <a:lnRef idx="1">
+              <a:schemeClr val="dk1"/>
+            </a:lnRef>
+            <a:fillRef idx="2">
+              <a:schemeClr val="dk1"/>
+            </a:fillRef>
+            <a:effectRef idx="1">
+              <a:schemeClr val="dk1"/>
+            </a:effectRef>
+            <a:fontRef idx="minor">
+              <a:schemeClr val="dk1"/>
+            </a:fontRef>
+          </p:style>
+          <p:txBody>
+            <a:bodyPr rtlCol="0" anchor="ctr"/>
+            <a:lstStyle/>
+            <a:p>
+              <a:pPr algn="ctr"/>
+              <a:endParaRPr lang="en-US"/>
+            </a:p>
+          </p:txBody>
+        </p:sp>
+        <p:sp>
+          <p:nvSpPr>
+            <p:cNvPr id="7" name="Rectangle: Rounded Corners 6">
+              <a:extLst>
+                <a:ext uri="{FF2B5EF4-FFF2-40B4-BE49-F238E27FC236}">
+                  <a16:creationId xmlns:a16="http://schemas.microsoft.com/office/drawing/2014/main" id="{449116FC-97BA-4A2B-96DA-F2EB42DAA3B3}"/>
+                </a:ext>
+              </a:extLst>
+            </p:cNvPr>
+            <p:cNvSpPr/>
+            <p:nvPr/>
+          </p:nvSpPr>
+          <p:spPr>
+            <a:xfrm>
+              <a:off x="2362200" y="4038600"/>
+              <a:ext cx="2743200" cy="1828800"/>
+            </a:xfrm>
+            <a:prstGeom prst="roundRect">
+              <a:avLst/>
+            </a:prstGeom>
+            <a:solidFill>
+              <a:schemeClr val="bg1"/>
+            </a:solidFill>
+            <a:ln w="12700">
+              <a:solidFill>
+                <a:schemeClr val="tx1"/>
+              </a:solidFill>
+            </a:ln>
+          </p:spPr>
+          <p:style>
+            <a:lnRef idx="2">
+              <a:schemeClr val="accent1">
+                <a:shade val="50000"/>
+              </a:schemeClr>
+            </a:lnRef>
+            <a:fillRef idx="1">
+              <a:schemeClr val="accent1"/>
+            </a:fillRef>
+            <a:effectRef idx="0">
+              <a:schemeClr val="accent1"/>
+            </a:effectRef>
+            <a:fontRef idx="minor">
+              <a:schemeClr val="lt1"/>
+            </a:fontRef>
+          </p:style>
+          <p:txBody>
+            <a:bodyPr rtlCol="0" anchor="ctr"/>
+            <a:lstStyle/>
+            <a:p>
+              <a:pPr algn="ctr"/>
+              <a:endParaRPr lang="en-US"/>
+            </a:p>
+          </p:txBody>
+        </p:sp>
+        <p:sp>
+          <p:nvSpPr>
+            <p:cNvPr id="8" name="Rectangle 7">
+              <a:extLst>
+                <a:ext uri="{FF2B5EF4-FFF2-40B4-BE49-F238E27FC236}">
+                  <a16:creationId xmlns:a16="http://schemas.microsoft.com/office/drawing/2014/main" id="{40A9D693-4C50-4B26-90F4-3411A5060A3C}"/>
+                </a:ext>
+              </a:extLst>
+            </p:cNvPr>
+            <p:cNvSpPr/>
+            <p:nvPr/>
+          </p:nvSpPr>
+          <p:spPr>
+            <a:xfrm>
+              <a:off x="1371600" y="2971800"/>
+              <a:ext cx="4876800" cy="1447800"/>
+            </a:xfrm>
+            <a:prstGeom prst="rect">
+              <a:avLst/>
+            </a:prstGeom>
+            <a:solidFill>
+              <a:schemeClr val="bg1"/>
+            </a:solidFill>
+            <a:ln>
+              <a:noFill/>
+            </a:ln>
+          </p:spPr>
+          <p:style>
+            <a:lnRef idx="2">
+              <a:schemeClr val="accent1">
+                <a:shade val="50000"/>
+              </a:schemeClr>
+            </a:lnRef>
+            <a:fillRef idx="1">
+              <a:schemeClr val="accent1"/>
+            </a:fillRef>
+            <a:effectRef idx="0">
+              <a:schemeClr val="accent1"/>
+            </a:effectRef>
+            <a:fontRef idx="minor">
+              <a:schemeClr val="lt1"/>
+            </a:fontRef>
+          </p:style>
+          <p:txBody>
+            <a:bodyPr rtlCol="0" anchor="ctr"/>
+            <a:lstStyle/>
+            <a:p>
+              <a:pPr algn="ctr"/>
+              <a:endParaRPr lang="en-US"/>
+            </a:p>
+          </p:txBody>
+        </p:sp>
+        <p:cxnSp>
+          <p:nvCxnSpPr>
+            <p:cNvPr id="10" name="Straight Connector 9">
+              <a:extLst>
+                <a:ext uri="{FF2B5EF4-FFF2-40B4-BE49-F238E27FC236}">
+                  <a16:creationId xmlns:a16="http://schemas.microsoft.com/office/drawing/2014/main" id="{CD5AF3B7-8616-407E-8344-0D926B1C0B7E}"/>
+                </a:ext>
+              </a:extLst>
+            </p:cNvPr>
+            <p:cNvCxnSpPr/>
+            <p:nvPr/>
+          </p:nvCxnSpPr>
+          <p:spPr>
+            <a:xfrm>
+              <a:off x="5105400" y="4419600"/>
+              <a:ext cx="457200" cy="0"/>
+            </a:xfrm>
+            <a:prstGeom prst="line">
+              <a:avLst/>
+            </a:prstGeom>
+          </p:spPr>
+          <p:style>
+            <a:lnRef idx="1">
+              <a:schemeClr val="dk1"/>
+            </a:lnRef>
+            <a:fillRef idx="0">
+              <a:schemeClr val="dk1"/>
+            </a:fillRef>
+            <a:effectRef idx="0">
+              <a:schemeClr val="dk1"/>
+            </a:effectRef>
+            <a:fontRef idx="minor">
+              <a:schemeClr val="tx1"/>
+            </a:fontRef>
+          </p:style>
+        </p:cxnSp>
+        <p:sp>
+          <p:nvSpPr>
+            <p:cNvPr id="5" name="Rectangle 4">
+              <a:extLst>
+                <a:ext uri="{FF2B5EF4-FFF2-40B4-BE49-F238E27FC236}">
+                  <a16:creationId xmlns:a16="http://schemas.microsoft.com/office/drawing/2014/main" id="{01035E17-C22F-470F-99B8-9C35F6D840FC}"/>
+                </a:ext>
+              </a:extLst>
+            </p:cNvPr>
+            <p:cNvSpPr/>
+            <p:nvPr/>
+          </p:nvSpPr>
+          <p:spPr>
+            <a:xfrm>
+              <a:off x="952500" y="3116264"/>
+              <a:ext cx="2400300" cy="3352800"/>
+            </a:xfrm>
+            <a:prstGeom prst="rect">
+              <a:avLst/>
+            </a:prstGeom>
+            <a:solidFill>
+              <a:schemeClr val="bg2">
+                <a:lumMod val="90000"/>
+              </a:schemeClr>
+            </a:solidFill>
+            <a:ln>
+              <a:solidFill>
+                <a:schemeClr val="bg2">
+                  <a:lumMod val="50000"/>
+                </a:schemeClr>
+              </a:solidFill>
+            </a:ln>
+          </p:spPr>
+          <p:style>
+            <a:lnRef idx="2">
+              <a:schemeClr val="accent1">
+                <a:shade val="50000"/>
+              </a:schemeClr>
+            </a:lnRef>
+            <a:fillRef idx="1">
+              <a:schemeClr val="accent1"/>
+            </a:fillRef>
+            <a:effectRef idx="0">
+              <a:schemeClr val="accent1"/>
+            </a:effectRef>
+            <a:fontRef idx="minor">
+              <a:schemeClr val="lt1"/>
+            </a:fontRef>
+          </p:style>
+          <p:txBody>
+            <a:bodyPr rtlCol="0" anchor="ctr"/>
+            <a:lstStyle/>
+            <a:p>
+              <a:pPr algn="ctr"/>
+              <a:endParaRPr lang="en-US"/>
+            </a:p>
+          </p:txBody>
+        </p:sp>
+      </p:grpSp>
+      <p:sp>
+        <p:nvSpPr>
+          <p:cNvPr id="17" name="Frame 16">
+            <a:extLst>
+              <a:ext uri="{FF2B5EF4-FFF2-40B4-BE49-F238E27FC236}">
+                <a16:creationId xmlns:a16="http://schemas.microsoft.com/office/drawing/2014/main" id="{1D7C5A8E-8A86-4AAC-B10C-C40316EE1C1B}"/>
+              </a:ext>
+            </a:extLst>
+          </p:cNvPr>
+          <p:cNvSpPr/>
+          <p:nvPr/>
+        </p:nvSpPr>
+        <p:spPr>
+          <a:xfrm>
+            <a:off x="685800" y="2606674"/>
+            <a:ext cx="6705600" cy="5165725"/>
+          </a:xfrm>
+          <a:prstGeom prst="frame">
+            <a:avLst>
+              <a:gd name="adj1" fmla="val 22545"/>
+            </a:avLst>
+          </a:prstGeom>
+          <a:solidFill>
+            <a:schemeClr val="bg1"/>
+          </a:solidFill>
+          <a:ln>
+            <a:noFill/>
+          </a:ln>
+          <a:effectLst>
+            <a:softEdge rad="127000"/>
+          </a:effectLst>
+        </p:spPr>
+        <p:style>
+          <a:lnRef idx="2">
+            <a:schemeClr val="accent1">
+              <a:shade val="50000"/>
+            </a:schemeClr>
+          </a:lnRef>
+          <a:fillRef idx="1">
+            <a:schemeClr val="accent1"/>
+          </a:fillRef>
+          <a:effectRef idx="0">
+            <a:schemeClr val="accent1"/>
+          </a:effectRef>
+          <a:fontRef idx="minor">
+            <a:schemeClr val="lt1"/>
+          </a:fontRef>
+        </p:style>
+        <p:txBody>
+          <a:bodyPr rtlCol="0" anchor="ctr"/>
+          <a:lstStyle/>
+          <a:p>
+            <a:pPr algn="ctr"/>
+            <a:endParaRPr lang="en-US" dirty="0">
+              <a:solidFill>
+                <a:schemeClr val="tx1"/>
+              </a:solidFill>
+            </a:endParaRPr>
+          </a:p>
+        </p:txBody>
+      </p:sp>
+      <p:cxnSp>
+        <p:nvCxnSpPr>
+          <p:cNvPr id="19" name="Straight Arrow Connector 18">
+            <a:extLst>
+              <a:ext uri="{FF2B5EF4-FFF2-40B4-BE49-F238E27FC236}">
+                <a16:creationId xmlns:a16="http://schemas.microsoft.com/office/drawing/2014/main" id="{3EAD54AC-BE73-454E-A004-33F4F5ACBE8E}"/>
+              </a:ext>
+            </a:extLst>
+          </p:cNvPr>
+          <p:cNvCxnSpPr/>
+          <p:nvPr/>
+        </p:nvCxnSpPr>
+        <p:spPr>
+          <a:xfrm>
+            <a:off x="5772150" y="4318793"/>
+            <a:ext cx="1143000" cy="722314"/>
+          </a:xfrm>
+          <a:prstGeom prst="straightConnector1">
+            <a:avLst/>
+          </a:prstGeom>
+          <a:ln>
+            <a:solidFill>
+              <a:srgbClr val="FF0000"/>
+            </a:solidFill>
+            <a:tailEnd type="triangle"/>
+          </a:ln>
+        </p:spPr>
+        <p:style>
+          <a:lnRef idx="3">
+            <a:schemeClr val="accent2"/>
+          </a:lnRef>
+          <a:fillRef idx="0">
+            <a:schemeClr val="accent2"/>
+          </a:fillRef>
+          <a:effectRef idx="2">
+            <a:schemeClr val="accent2"/>
+          </a:effectRef>
+          <a:fontRef idx="minor">
+            <a:schemeClr val="tx1"/>
+          </a:fontRef>
+        </p:style>
+      </p:cxnSp>
+      <p:sp>
+        <p:nvSpPr>
+          <p:cNvPr id="20" name="TextBox 19">
+            <a:extLst>
+              <a:ext uri="{FF2B5EF4-FFF2-40B4-BE49-F238E27FC236}">
+                <a16:creationId xmlns:a16="http://schemas.microsoft.com/office/drawing/2014/main" id="{1E7A62D6-6A57-40FF-B602-5723FAD57B92}"/>
+              </a:ext>
+            </a:extLst>
+          </p:cNvPr>
+          <p:cNvSpPr txBox="1"/>
+          <p:nvPr/>
+        </p:nvSpPr>
+        <p:spPr>
+          <a:xfrm>
+            <a:off x="6882335" y="4936094"/>
+            <a:ext cx="851965" cy="369332"/>
+          </a:xfrm>
+          <a:prstGeom prst="rect">
+            <a:avLst/>
+          </a:prstGeom>
+          <a:noFill/>
+        </p:spPr>
+        <p:txBody>
+          <a:bodyPr wrap="none" rtlCol="0">
+            <a:spAutoFit/>
+          </a:bodyPr>
+          <a:lstStyle/>
+          <a:p>
+            <a:r>
+              <a:rPr lang="en-US" dirty="0">
+                <a:solidFill>
+                  <a:srgbClr val="FF0000"/>
+                </a:solidFill>
+              </a:rPr>
+              <a:t>200 lbs</a:t>
+            </a:r>
+          </a:p>
+        </p:txBody>
+      </p:sp>
+      <p:cxnSp>
+        <p:nvCxnSpPr>
+          <p:cNvPr id="22" name="Straight Connector 21">
+            <a:extLst>
+              <a:ext uri="{FF2B5EF4-FFF2-40B4-BE49-F238E27FC236}">
+                <a16:creationId xmlns:a16="http://schemas.microsoft.com/office/drawing/2014/main" id="{931FAA19-EF74-4867-A7D8-DEDB2A46FA38}"/>
+              </a:ext>
+            </a:extLst>
+          </p:cNvPr>
+          <p:cNvCxnSpPr/>
+          <p:nvPr/>
+        </p:nvCxnSpPr>
+        <p:spPr>
+          <a:xfrm flipV="1">
+            <a:off x="5772150" y="3582986"/>
+            <a:ext cx="0" cy="531814"/>
+          </a:xfrm>
+          <a:prstGeom prst="line">
+            <a:avLst/>
+          </a:prstGeom>
+        </p:spPr>
+        <p:style>
+          <a:lnRef idx="1">
+            <a:schemeClr val="accent1"/>
+          </a:lnRef>
+          <a:fillRef idx="0">
+            <a:schemeClr val="accent1"/>
+          </a:fillRef>
+          <a:effectRef idx="0">
+            <a:schemeClr val="accent1"/>
+          </a:effectRef>
+          <a:fontRef idx="minor">
+            <a:schemeClr val="tx1"/>
+          </a:fontRef>
+        </p:style>
+      </p:cxnSp>
+      <p:cxnSp>
+        <p:nvCxnSpPr>
+          <p:cNvPr id="23" name="Straight Connector 22">
+            <a:extLst>
+              <a:ext uri="{FF2B5EF4-FFF2-40B4-BE49-F238E27FC236}">
+                <a16:creationId xmlns:a16="http://schemas.microsoft.com/office/drawing/2014/main" id="{57CE11DC-A436-45A1-A54D-417E2012FB58}"/>
+              </a:ext>
+            </a:extLst>
+          </p:cNvPr>
+          <p:cNvCxnSpPr>
+            <a:cxnSpLocks/>
+          </p:cNvCxnSpPr>
+          <p:nvPr/>
+        </p:nvCxnSpPr>
+        <p:spPr>
+          <a:xfrm flipH="1">
+            <a:off x="3790950" y="3848893"/>
+            <a:ext cx="1981200" cy="1"/>
+          </a:xfrm>
+          <a:prstGeom prst="line">
+            <a:avLst/>
+          </a:prstGeom>
+        </p:spPr>
+        <p:style>
+          <a:lnRef idx="1">
+            <a:schemeClr val="accent1"/>
+          </a:lnRef>
+          <a:fillRef idx="0">
+            <a:schemeClr val="accent1"/>
+          </a:fillRef>
+          <a:effectRef idx="0">
+            <a:schemeClr val="accent1"/>
+          </a:effectRef>
+          <a:fontRef idx="minor">
+            <a:schemeClr val="tx1"/>
+          </a:fontRef>
+        </p:style>
+      </p:cxnSp>
+      <p:cxnSp>
+        <p:nvCxnSpPr>
+          <p:cNvPr id="26" name="Straight Connector 25">
+            <a:extLst>
+              <a:ext uri="{FF2B5EF4-FFF2-40B4-BE49-F238E27FC236}">
+                <a16:creationId xmlns:a16="http://schemas.microsoft.com/office/drawing/2014/main" id="{BB7BD503-CAE2-4A61-9CFD-DC5373DBE30C}"/>
+              </a:ext>
+            </a:extLst>
+          </p:cNvPr>
+          <p:cNvCxnSpPr>
+            <a:cxnSpLocks/>
+          </p:cNvCxnSpPr>
+          <p:nvPr/>
+        </p:nvCxnSpPr>
+        <p:spPr>
+          <a:xfrm flipH="1">
+            <a:off x="3000375" y="4306886"/>
+            <a:ext cx="2438400" cy="0"/>
+          </a:xfrm>
+          <a:prstGeom prst="line">
+            <a:avLst/>
+          </a:prstGeom>
+        </p:spPr>
+        <p:style>
+          <a:lnRef idx="1">
+            <a:schemeClr val="accent1"/>
+          </a:lnRef>
+          <a:fillRef idx="0">
+            <a:schemeClr val="accent1"/>
+          </a:fillRef>
+          <a:effectRef idx="0">
+            <a:schemeClr val="accent1"/>
+          </a:effectRef>
+          <a:fontRef idx="minor">
+            <a:schemeClr val="tx1"/>
+          </a:fontRef>
+        </p:style>
+      </p:cxnSp>
+      <p:cxnSp>
+        <p:nvCxnSpPr>
+          <p:cNvPr id="31" name="Straight Connector 30">
+            <a:extLst>
+              <a:ext uri="{FF2B5EF4-FFF2-40B4-BE49-F238E27FC236}">
+                <a16:creationId xmlns:a16="http://schemas.microsoft.com/office/drawing/2014/main" id="{F62430E6-CB0E-4E7D-9B22-781918A5638E}"/>
+              </a:ext>
+            </a:extLst>
+          </p:cNvPr>
+          <p:cNvCxnSpPr>
+            <a:cxnSpLocks/>
+          </p:cNvCxnSpPr>
+          <p:nvPr/>
+        </p:nvCxnSpPr>
+        <p:spPr>
+          <a:xfrm flipH="1">
+            <a:off x="3000375" y="5943600"/>
+            <a:ext cx="619125" cy="0"/>
+          </a:xfrm>
+          <a:prstGeom prst="line">
+            <a:avLst/>
+          </a:prstGeom>
+        </p:spPr>
+        <p:style>
+          <a:lnRef idx="1">
+            <a:schemeClr val="accent1"/>
+          </a:lnRef>
+          <a:fillRef idx="0">
+            <a:schemeClr val="accent1"/>
+          </a:fillRef>
+          <a:effectRef idx="0">
+            <a:schemeClr val="accent1"/>
+          </a:effectRef>
+          <a:fontRef idx="minor">
+            <a:schemeClr val="tx1"/>
+          </a:fontRef>
+        </p:style>
+      </p:cxnSp>
+      <p:cxnSp>
+        <p:nvCxnSpPr>
+          <p:cNvPr id="33" name="Straight Connector 32">
+            <a:extLst>
+              <a:ext uri="{FF2B5EF4-FFF2-40B4-BE49-F238E27FC236}">
+                <a16:creationId xmlns:a16="http://schemas.microsoft.com/office/drawing/2014/main" id="{0A33C212-320E-45F1-B981-E6A075EF89AB}"/>
+              </a:ext>
+            </a:extLst>
+          </p:cNvPr>
+          <p:cNvCxnSpPr>
+            <a:cxnSpLocks/>
+          </p:cNvCxnSpPr>
+          <p:nvPr/>
+        </p:nvCxnSpPr>
+        <p:spPr>
+          <a:xfrm flipH="1">
+            <a:off x="3309937" y="4318793"/>
+            <a:ext cx="1" cy="1624807"/>
+          </a:xfrm>
+          <a:prstGeom prst="line">
+            <a:avLst/>
+          </a:prstGeom>
+        </p:spPr>
+        <p:style>
+          <a:lnRef idx="1">
+            <a:schemeClr val="accent1"/>
+          </a:lnRef>
+          <a:fillRef idx="0">
+            <a:schemeClr val="accent1"/>
+          </a:fillRef>
+          <a:effectRef idx="0">
+            <a:schemeClr val="accent1"/>
+          </a:effectRef>
+          <a:fontRef idx="minor">
+            <a:schemeClr val="tx1"/>
+          </a:fontRef>
+        </p:style>
+      </p:cxnSp>
+      <p:sp>
+        <p:nvSpPr>
+          <p:cNvPr id="36" name="TextBox 35">
+            <a:extLst>
+              <a:ext uri="{FF2B5EF4-FFF2-40B4-BE49-F238E27FC236}">
+                <a16:creationId xmlns:a16="http://schemas.microsoft.com/office/drawing/2014/main" id="{8BB2FE78-7286-40EE-A83C-B6781EDCE758}"/>
+              </a:ext>
+            </a:extLst>
+          </p:cNvPr>
+          <p:cNvSpPr txBox="1"/>
+          <p:nvPr/>
+        </p:nvSpPr>
+        <p:spPr>
+          <a:xfrm>
+            <a:off x="4528463" y="3660814"/>
+            <a:ext cx="529312" cy="369332"/>
+          </a:xfrm>
+          <a:prstGeom prst="rect">
+            <a:avLst/>
+          </a:prstGeom>
+          <a:solidFill>
+            <a:schemeClr val="bg1"/>
+          </a:solidFill>
+        </p:spPr>
+        <p:txBody>
+          <a:bodyPr wrap="none" rtlCol="0">
+            <a:spAutoFit/>
+          </a:bodyPr>
+          <a:lstStyle/>
+          <a:p>
+            <a:r>
+              <a:rPr lang="en-US" dirty="0">
+                <a:solidFill>
+                  <a:srgbClr val="0070C0"/>
+                </a:solidFill>
+              </a:rPr>
+              <a:t>4 in</a:t>
+            </a:r>
+          </a:p>
+        </p:txBody>
+      </p:sp>
+      <p:sp>
+        <p:nvSpPr>
+          <p:cNvPr id="37" name="TextBox 36">
+            <a:extLst>
+              <a:ext uri="{FF2B5EF4-FFF2-40B4-BE49-F238E27FC236}">
+                <a16:creationId xmlns:a16="http://schemas.microsoft.com/office/drawing/2014/main" id="{363B2149-1C7F-4B5C-A27C-FDE381A34CA4}"/>
+              </a:ext>
+            </a:extLst>
+          </p:cNvPr>
+          <p:cNvSpPr txBox="1"/>
+          <p:nvPr/>
+        </p:nvSpPr>
+        <p:spPr>
+          <a:xfrm>
+            <a:off x="3045281" y="4901206"/>
+            <a:ext cx="529312" cy="369332"/>
+          </a:xfrm>
+          <a:prstGeom prst="rect">
+            <a:avLst/>
+          </a:prstGeom>
+          <a:solidFill>
+            <a:schemeClr val="bg2">
+              <a:lumMod val="90000"/>
+            </a:schemeClr>
+          </a:solidFill>
+        </p:spPr>
+        <p:txBody>
+          <a:bodyPr wrap="none" rtlCol="0">
+            <a:spAutoFit/>
+          </a:bodyPr>
+          <a:lstStyle/>
+          <a:p>
+            <a:r>
+              <a:rPr lang="en-US" dirty="0">
+                <a:solidFill>
+                  <a:srgbClr val="0070C0"/>
+                </a:solidFill>
+              </a:rPr>
+              <a:t>3 in</a:t>
+            </a:r>
+          </a:p>
+        </p:txBody>
+      </p:sp>
+      <p:cxnSp>
+        <p:nvCxnSpPr>
+          <p:cNvPr id="39" name="Straight Connector 38">
+            <a:extLst>
+              <a:ext uri="{FF2B5EF4-FFF2-40B4-BE49-F238E27FC236}">
+                <a16:creationId xmlns:a16="http://schemas.microsoft.com/office/drawing/2014/main" id="{B8AC5CAD-7BE4-42BA-8D89-289F519775F1}"/>
+              </a:ext>
+            </a:extLst>
+          </p:cNvPr>
+          <p:cNvCxnSpPr/>
+          <p:nvPr/>
+        </p:nvCxnSpPr>
+        <p:spPr>
+          <a:xfrm>
+            <a:off x="6248400" y="4318793"/>
+            <a:ext cx="533400" cy="0"/>
+          </a:xfrm>
+          <a:prstGeom prst="line">
+            <a:avLst/>
+          </a:prstGeom>
+        </p:spPr>
+        <p:style>
+          <a:lnRef idx="1">
+            <a:schemeClr val="accent1"/>
+          </a:lnRef>
+          <a:fillRef idx="0">
+            <a:schemeClr val="accent1"/>
+          </a:fillRef>
+          <a:effectRef idx="0">
+            <a:schemeClr val="accent1"/>
+          </a:effectRef>
+          <a:fontRef idx="minor">
+            <a:schemeClr val="tx1"/>
+          </a:fontRef>
+        </p:style>
+      </p:cxnSp>
+      <p:sp>
+        <p:nvSpPr>
+          <p:cNvPr id="40" name="Arc 39">
+            <a:extLst>
+              <a:ext uri="{FF2B5EF4-FFF2-40B4-BE49-F238E27FC236}">
+                <a16:creationId xmlns:a16="http://schemas.microsoft.com/office/drawing/2014/main" id="{36E62FCD-347C-4313-BE3F-DDEFC194B094}"/>
+              </a:ext>
+            </a:extLst>
+          </p:cNvPr>
+          <p:cNvSpPr/>
+          <p:nvPr/>
+        </p:nvSpPr>
+        <p:spPr>
+          <a:xfrm>
+            <a:off x="5105400" y="3629305"/>
+            <a:ext cx="1371600" cy="1371600"/>
+          </a:xfrm>
+          <a:prstGeom prst="arc">
+            <a:avLst>
+              <a:gd name="adj1" fmla="val 82102"/>
+              <a:gd name="adj2" fmla="val 1815650"/>
+            </a:avLst>
+          </a:prstGeom>
+        </p:spPr>
+        <p:style>
+          <a:lnRef idx="1">
+            <a:schemeClr val="accent1"/>
+          </a:lnRef>
+          <a:fillRef idx="0">
+            <a:schemeClr val="accent1"/>
+          </a:fillRef>
+          <a:effectRef idx="0">
+            <a:schemeClr val="accent1"/>
+          </a:effectRef>
+          <a:fontRef idx="minor">
+            <a:schemeClr val="tx1"/>
+          </a:fontRef>
+        </p:style>
+        <p:txBody>
+          <a:bodyPr rtlCol="0" anchor="ctr"/>
+          <a:lstStyle/>
+          <a:p>
+            <a:pPr algn="ctr"/>
+            <a:endParaRPr lang="en-US"/>
+          </a:p>
+        </p:txBody>
+      </p:sp>
+      <p:sp>
+        <p:nvSpPr>
+          <p:cNvPr id="41" name="TextBox 40">
+            <a:extLst>
+              <a:ext uri="{FF2B5EF4-FFF2-40B4-BE49-F238E27FC236}">
+                <a16:creationId xmlns:a16="http://schemas.microsoft.com/office/drawing/2014/main" id="{8AB6AF84-88DE-4317-80B8-B037D61292D8}"/>
+              </a:ext>
+            </a:extLst>
+          </p:cNvPr>
+          <p:cNvSpPr txBox="1"/>
+          <p:nvPr/>
+        </p:nvSpPr>
+        <p:spPr>
+          <a:xfrm>
+            <a:off x="6450213" y="4353205"/>
+            <a:ext cx="500458" cy="369332"/>
+          </a:xfrm>
+          <a:prstGeom prst="rect">
+            <a:avLst/>
+          </a:prstGeom>
+          <a:noFill/>
+        </p:spPr>
+        <p:txBody>
+          <a:bodyPr wrap="none" rtlCol="0">
+            <a:spAutoFit/>
+          </a:bodyPr>
+          <a:lstStyle/>
+          <a:p>
+            <a:r>
+              <a:rPr lang="en-US" dirty="0">
+                <a:solidFill>
+                  <a:srgbClr val="0070C0"/>
+                </a:solidFill>
+              </a:rPr>
+              <a:t>35</a:t>
+            </a:r>
+            <a:r>
+              <a:rPr lang="en-US" baseline="30000" dirty="0">
+                <a:solidFill>
+                  <a:srgbClr val="0070C0"/>
+                </a:solidFill>
+              </a:rPr>
+              <a:t>o</a:t>
+            </a:r>
+          </a:p>
+        </p:txBody>
+      </p:sp>
+      <p:cxnSp>
+        <p:nvCxnSpPr>
+          <p:cNvPr id="43" name="Straight Connector 42">
+            <a:extLst>
+              <a:ext uri="{FF2B5EF4-FFF2-40B4-BE49-F238E27FC236}">
+                <a16:creationId xmlns:a16="http://schemas.microsoft.com/office/drawing/2014/main" id="{CCDB2090-4604-4214-A3EC-A820916248BB}"/>
+              </a:ext>
+            </a:extLst>
+          </p:cNvPr>
+          <p:cNvCxnSpPr/>
+          <p:nvPr/>
+        </p:nvCxnSpPr>
+        <p:spPr>
+          <a:xfrm>
+            <a:off x="3886200" y="5565813"/>
+            <a:ext cx="0" cy="914400"/>
+          </a:xfrm>
+          <a:prstGeom prst="line">
+            <a:avLst/>
+          </a:prstGeom>
+          <a:ln>
+            <a:prstDash val="lgDash"/>
+          </a:ln>
+        </p:spPr>
+        <p:style>
+          <a:lnRef idx="1">
+            <a:schemeClr val="accent1"/>
+          </a:lnRef>
+          <a:fillRef idx="0">
+            <a:schemeClr val="accent1"/>
+          </a:fillRef>
+          <a:effectRef idx="0">
+            <a:schemeClr val="accent1"/>
+          </a:effectRef>
+          <a:fontRef idx="minor">
+            <a:schemeClr val="tx1"/>
+          </a:fontRef>
+        </p:style>
+      </p:cxnSp>
+      <p:sp>
+        <p:nvSpPr>
+          <p:cNvPr id="44" name="TextBox 43">
+            <a:extLst>
+              <a:ext uri="{FF2B5EF4-FFF2-40B4-BE49-F238E27FC236}">
+                <a16:creationId xmlns:a16="http://schemas.microsoft.com/office/drawing/2014/main" id="{DB5EB774-30EB-477C-8E69-22935E2CEE95}"/>
+              </a:ext>
+            </a:extLst>
+          </p:cNvPr>
+          <p:cNvSpPr txBox="1"/>
+          <p:nvPr/>
+        </p:nvSpPr>
+        <p:spPr>
+          <a:xfrm>
+            <a:off x="3743326" y="5220808"/>
+            <a:ext cx="295274" cy="369332"/>
+          </a:xfrm>
+          <a:prstGeom prst="rect">
+            <a:avLst/>
+          </a:prstGeom>
+          <a:noFill/>
+        </p:spPr>
+        <p:txBody>
+          <a:bodyPr wrap="none" rtlCol="0">
+            <a:spAutoFit/>
+          </a:bodyPr>
+          <a:lstStyle/>
+          <a:p>
+            <a:r>
+              <a:rPr lang="en-US" dirty="0">
+                <a:solidFill>
+                  <a:srgbClr val="0070C0"/>
+                </a:solidFill>
+              </a:rPr>
+              <a:t>a</a:t>
+            </a:r>
+          </a:p>
+        </p:txBody>
+      </p:sp>
+      <p:sp>
+        <p:nvSpPr>
+          <p:cNvPr id="45" name="TextBox 44">
+            <a:extLst>
+              <a:ext uri="{FF2B5EF4-FFF2-40B4-BE49-F238E27FC236}">
+                <a16:creationId xmlns:a16="http://schemas.microsoft.com/office/drawing/2014/main" id="{5C82D9D6-B2C2-4FAC-A14A-E35359A50BD1}"/>
+              </a:ext>
+            </a:extLst>
+          </p:cNvPr>
+          <p:cNvSpPr txBox="1"/>
+          <p:nvPr/>
+        </p:nvSpPr>
+        <p:spPr>
+          <a:xfrm>
+            <a:off x="3743326" y="6402943"/>
+            <a:ext cx="295274" cy="369332"/>
+          </a:xfrm>
+          <a:prstGeom prst="rect">
+            <a:avLst/>
+          </a:prstGeom>
+          <a:noFill/>
+        </p:spPr>
+        <p:txBody>
+          <a:bodyPr wrap="none" rtlCol="0">
+            <a:spAutoFit/>
+          </a:bodyPr>
+          <a:lstStyle/>
+          <a:p>
+            <a:r>
+              <a:rPr lang="en-US" dirty="0">
+                <a:solidFill>
+                  <a:srgbClr val="0070C0"/>
+                </a:solidFill>
+              </a:rPr>
+              <a:t>a</a:t>
+            </a:r>
+          </a:p>
+        </p:txBody>
+      </p:sp>
+    </p:spTree>
+    <p:extLst>
+      <p:ext uri="{BB962C8B-B14F-4D97-AF65-F5344CB8AC3E}">
+        <p14:creationId xmlns:p14="http://schemas.microsoft.com/office/powerpoint/2010/main" val="665470293"/>
+      </p:ext>
+    </p:extLst>
+  </p:cSld>
+  <p:clrMapOvr>
+    <a:masterClrMapping/>
+  </p:clrMapOvr>
+</p:sld>
+</file>
+
+<file path=ppt/slides/slide12.xml><?xml version="1.0" encoding="utf-8"?>
+<p:sld xmlns:a="http://schemas.openxmlformats.org/drawingml/2006/main" xmlns:r="http://schemas.openxmlformats.org/officeDocument/2006/relationships" xmlns:p="http://schemas.openxmlformats.org/presentationml/2006/main">
+  <p:cSld>
+    <p:spTree>
+      <p:nvGrpSpPr>
+        <p:cNvPr id="1" name=""/>
+        <p:cNvGrpSpPr/>
+        <p:nvPr/>
+      </p:nvGrpSpPr>
+      <p:grpSpPr>
+        <a:xfrm>
+          <a:off x="0" y="0"/>
+          <a:ext cx="0" cy="0"/>
+          <a:chOff x="0" y="0"/>
+          <a:chExt cx="0" cy="0"/>
+        </a:xfrm>
+      </p:grpSpPr>
+      <p:sp>
+        <p:nvSpPr>
+          <p:cNvPr id="2" name="Title 1">
+            <a:extLst>
+              <a:ext uri="{FF2B5EF4-FFF2-40B4-BE49-F238E27FC236}">
+                <a16:creationId xmlns:a16="http://schemas.microsoft.com/office/drawing/2014/main" id="{9F6878C6-2591-4C7A-93D2-F8B3376DFCE4}"/>
+              </a:ext>
+            </a:extLst>
+          </p:cNvPr>
+          <p:cNvSpPr>
+            <a:spLocks noGrp="1"/>
+          </p:cNvSpPr>
+          <p:nvPr>
+            <p:ph type="title"/>
+          </p:nvPr>
+        </p:nvSpPr>
+        <p:spPr/>
+        <p:txBody>
+          <a:bodyPr/>
+          <a:lstStyle/>
+          <a:p>
+            <a:r>
+              <a:rPr lang="en-US" dirty="0"/>
+              <a:t>Internal Forces Worked Example</a:t>
+            </a:r>
+          </a:p>
+        </p:txBody>
+      </p:sp>
+      <p:sp>
+        <p:nvSpPr>
+          <p:cNvPr id="3" name="Content Placeholder 2">
+            <a:extLst>
+              <a:ext uri="{FF2B5EF4-FFF2-40B4-BE49-F238E27FC236}">
+                <a16:creationId xmlns:a16="http://schemas.microsoft.com/office/drawing/2014/main" id="{DE89A7B7-A3EC-4099-90E1-F492BE222EB6}"/>
+              </a:ext>
+            </a:extLst>
+          </p:cNvPr>
+          <p:cNvSpPr>
+            <a:spLocks noGrp="1"/>
+          </p:cNvSpPr>
+          <p:nvPr>
+            <p:ph idx="1"/>
+          </p:nvPr>
+        </p:nvSpPr>
+        <p:spPr>
+          <a:xfrm>
+            <a:off x="457200" y="1600200"/>
+            <a:ext cx="7086842" cy="1752599"/>
+          </a:xfrm>
+        </p:spPr>
+        <p:txBody>
+          <a:bodyPr>
+            <a:normAutofit fontScale="85000" lnSpcReduction="10000"/>
+          </a:bodyPr>
+          <a:lstStyle/>
+          <a:p>
+            <a:r>
+              <a:rPr lang="en-US" dirty="0"/>
+              <a:t>A mounting bracket with the dimensions shown below is subjected to a 700 N load and two 350 N reaction forces. Determine all internal forces and moments at points B and C.</a:t>
+            </a:r>
+          </a:p>
+        </p:txBody>
+      </p:sp>
+      <p:sp>
+        <p:nvSpPr>
+          <p:cNvPr id="4" name="Slide Number Placeholder 3">
+            <a:extLst>
+              <a:ext uri="{FF2B5EF4-FFF2-40B4-BE49-F238E27FC236}">
+                <a16:creationId xmlns:a16="http://schemas.microsoft.com/office/drawing/2014/main" id="{B36FD9B8-96EC-4E42-8C34-860B37B9D794}"/>
+              </a:ext>
+            </a:extLst>
+          </p:cNvPr>
+          <p:cNvSpPr>
+            <a:spLocks noGrp="1"/>
+          </p:cNvSpPr>
+          <p:nvPr>
+            <p:ph type="sldNum" sz="quarter" idx="12"/>
+          </p:nvPr>
+        </p:nvSpPr>
+        <p:spPr/>
+        <p:txBody>
+          <a:bodyPr/>
+          <a:lstStyle/>
+          <a:p>
+            <a:fld id="{929262FE-7F58-4A1E-8AF3-5A510A86DEBD}" type="slidenum">
+              <a:rPr lang="en-US" smtClean="0"/>
+              <a:t>12</a:t>
+            </a:fld>
+            <a:endParaRPr lang="en-US"/>
+          </a:p>
+        </p:txBody>
+      </p:sp>
+      <p:sp>
+        <p:nvSpPr>
+          <p:cNvPr id="6" name="Cube 5">
+            <a:extLst>
+              <a:ext uri="{FF2B5EF4-FFF2-40B4-BE49-F238E27FC236}">
+                <a16:creationId xmlns:a16="http://schemas.microsoft.com/office/drawing/2014/main" id="{4FF5A453-A46D-48ED-9AFA-89F72A432046}"/>
+              </a:ext>
+            </a:extLst>
+          </p:cNvPr>
+          <p:cNvSpPr/>
+          <p:nvPr/>
+        </p:nvSpPr>
+        <p:spPr>
+          <a:xfrm>
+            <a:off x="762000" y="4190999"/>
+            <a:ext cx="1676400" cy="2324099"/>
+          </a:xfrm>
+          <a:prstGeom prst="cube">
+            <a:avLst>
+              <a:gd name="adj" fmla="val 84028"/>
+            </a:avLst>
+          </a:prstGeom>
+        </p:spPr>
+        <p:style>
+          <a:lnRef idx="1">
+            <a:schemeClr val="dk1"/>
+          </a:lnRef>
+          <a:fillRef idx="2">
+            <a:schemeClr val="dk1"/>
+          </a:fillRef>
+          <a:effectRef idx="1">
+            <a:schemeClr val="dk1"/>
+          </a:effectRef>
+          <a:fontRef idx="minor">
+            <a:schemeClr val="dk1"/>
+          </a:fontRef>
+        </p:style>
+        <p:txBody>
+          <a:bodyPr rtlCol="0" anchor="ctr"/>
+          <a:lstStyle/>
+          <a:p>
+            <a:pPr algn="ctr"/>
+            <a:endParaRPr lang="en-US"/>
+          </a:p>
+        </p:txBody>
+      </p:sp>
+      <p:sp>
+        <p:nvSpPr>
+          <p:cNvPr id="5" name="Cylinder 4">
+            <a:extLst>
+              <a:ext uri="{FF2B5EF4-FFF2-40B4-BE49-F238E27FC236}">
+                <a16:creationId xmlns:a16="http://schemas.microsoft.com/office/drawing/2014/main" id="{E03C371E-C6B0-412C-8E7E-8F75E6042B7E}"/>
+              </a:ext>
+            </a:extLst>
+          </p:cNvPr>
+          <p:cNvSpPr/>
+          <p:nvPr/>
+        </p:nvSpPr>
+        <p:spPr>
+          <a:xfrm rot="5400000">
+            <a:off x="4153694" y="2497137"/>
+            <a:ext cx="684213" cy="4457700"/>
+          </a:xfrm>
+          <a:prstGeom prst="can">
+            <a:avLst/>
+          </a:prstGeom>
+        </p:spPr>
+        <p:style>
+          <a:lnRef idx="1">
+            <a:schemeClr val="dk1"/>
+          </a:lnRef>
+          <a:fillRef idx="2">
+            <a:schemeClr val="dk1"/>
+          </a:fillRef>
+          <a:effectRef idx="1">
+            <a:schemeClr val="dk1"/>
+          </a:effectRef>
+          <a:fontRef idx="minor">
+            <a:schemeClr val="dk1"/>
+          </a:fontRef>
+        </p:style>
+        <p:txBody>
+          <a:bodyPr rtlCol="0" anchor="ctr"/>
+          <a:lstStyle/>
+          <a:p>
+            <a:pPr algn="ctr"/>
+            <a:endParaRPr lang="en-US"/>
+          </a:p>
+        </p:txBody>
+      </p:sp>
+      <p:sp>
+        <p:nvSpPr>
+          <p:cNvPr id="7" name="Cube 6">
+            <a:extLst>
+              <a:ext uri="{FF2B5EF4-FFF2-40B4-BE49-F238E27FC236}">
+                <a16:creationId xmlns:a16="http://schemas.microsoft.com/office/drawing/2014/main" id="{C876C99F-7B24-4A0C-BEA8-4433634097F0}"/>
+              </a:ext>
+            </a:extLst>
+          </p:cNvPr>
+          <p:cNvSpPr/>
+          <p:nvPr/>
+        </p:nvSpPr>
+        <p:spPr>
+          <a:xfrm>
+            <a:off x="6400800" y="2971800"/>
+            <a:ext cx="1676400" cy="2324099"/>
+          </a:xfrm>
+          <a:prstGeom prst="cube">
+            <a:avLst>
+              <a:gd name="adj" fmla="val 84028"/>
+            </a:avLst>
+          </a:prstGeom>
+        </p:spPr>
+        <p:style>
+          <a:lnRef idx="1">
+            <a:schemeClr val="dk1"/>
+          </a:lnRef>
+          <a:fillRef idx="2">
+            <a:schemeClr val="dk1"/>
+          </a:fillRef>
+          <a:effectRef idx="1">
+            <a:schemeClr val="dk1"/>
+          </a:effectRef>
+          <a:fontRef idx="minor">
+            <a:schemeClr val="dk1"/>
+          </a:fontRef>
+        </p:style>
+        <p:txBody>
+          <a:bodyPr rtlCol="0" anchor="ctr"/>
+          <a:lstStyle/>
+          <a:p>
+            <a:pPr algn="ctr"/>
+            <a:endParaRPr lang="en-US"/>
+          </a:p>
+        </p:txBody>
+      </p:sp>
+      <p:sp>
+        <p:nvSpPr>
+          <p:cNvPr id="8" name="Oval 7">
+            <a:extLst>
+              <a:ext uri="{FF2B5EF4-FFF2-40B4-BE49-F238E27FC236}">
+                <a16:creationId xmlns:a16="http://schemas.microsoft.com/office/drawing/2014/main" id="{DB0B0BF7-441D-41A4-9ADE-8F34370FA05E}"/>
+              </a:ext>
+            </a:extLst>
+          </p:cNvPr>
+          <p:cNvSpPr/>
+          <p:nvPr/>
+        </p:nvSpPr>
+        <p:spPr>
+          <a:xfrm>
+            <a:off x="6715125" y="4371180"/>
+            <a:ext cx="228600" cy="684214"/>
+          </a:xfrm>
+          <a:prstGeom prst="ellipse">
+            <a:avLst/>
+          </a:prstGeom>
+        </p:spPr>
+        <p:style>
+          <a:lnRef idx="1">
+            <a:schemeClr val="dk1"/>
+          </a:lnRef>
+          <a:fillRef idx="2">
+            <a:schemeClr val="dk1"/>
+          </a:fillRef>
+          <a:effectRef idx="1">
+            <a:schemeClr val="dk1"/>
+          </a:effectRef>
+          <a:fontRef idx="minor">
+            <a:schemeClr val="dk1"/>
+          </a:fontRef>
+        </p:style>
+        <p:txBody>
+          <a:bodyPr rtlCol="0" anchor="ctr"/>
+          <a:lstStyle/>
+          <a:p>
+            <a:pPr algn="ctr"/>
+            <a:endParaRPr lang="en-US"/>
+          </a:p>
+        </p:txBody>
+      </p:sp>
+      <p:sp>
+        <p:nvSpPr>
+          <p:cNvPr id="9" name="TextBox 8">
+            <a:extLst>
+              <a:ext uri="{FF2B5EF4-FFF2-40B4-BE49-F238E27FC236}">
+                <a16:creationId xmlns:a16="http://schemas.microsoft.com/office/drawing/2014/main" id="{5DF273C5-3082-49EE-9282-2045811E325F}"/>
+              </a:ext>
+            </a:extLst>
+          </p:cNvPr>
+          <p:cNvSpPr txBox="1"/>
+          <p:nvPr/>
+        </p:nvSpPr>
+        <p:spPr>
+          <a:xfrm>
+            <a:off x="457200" y="5843073"/>
+            <a:ext cx="317716" cy="369332"/>
+          </a:xfrm>
+          <a:prstGeom prst="rect">
+            <a:avLst/>
+          </a:prstGeom>
+          <a:noFill/>
+        </p:spPr>
+        <p:txBody>
+          <a:bodyPr wrap="none" rtlCol="0">
+            <a:spAutoFit/>
+          </a:bodyPr>
+          <a:lstStyle/>
+          <a:p>
+            <a:r>
+              <a:rPr lang="en-US" dirty="0"/>
+              <a:t>A</a:t>
+            </a:r>
+          </a:p>
+        </p:txBody>
+      </p:sp>
+      <p:sp>
+        <p:nvSpPr>
+          <p:cNvPr id="10" name="TextBox 9">
+            <a:extLst>
+              <a:ext uri="{FF2B5EF4-FFF2-40B4-BE49-F238E27FC236}">
+                <a16:creationId xmlns:a16="http://schemas.microsoft.com/office/drawing/2014/main" id="{7496DC6C-6F55-4890-93C4-BD0A44E7552F}"/>
+              </a:ext>
+            </a:extLst>
+          </p:cNvPr>
+          <p:cNvSpPr txBox="1"/>
+          <p:nvPr/>
+        </p:nvSpPr>
+        <p:spPr>
+          <a:xfrm>
+            <a:off x="2245450" y="4572747"/>
+            <a:ext cx="309700" cy="369332"/>
+          </a:xfrm>
+          <a:prstGeom prst="rect">
+            <a:avLst/>
+          </a:prstGeom>
+          <a:noFill/>
+        </p:spPr>
+        <p:txBody>
+          <a:bodyPr wrap="none" rtlCol="0">
+            <a:spAutoFit/>
+          </a:bodyPr>
+          <a:lstStyle/>
+          <a:p>
+            <a:r>
+              <a:rPr lang="en-US" dirty="0"/>
+              <a:t>B</a:t>
+            </a:r>
+          </a:p>
+        </p:txBody>
+      </p:sp>
+      <p:cxnSp>
+        <p:nvCxnSpPr>
+          <p:cNvPr id="11" name="Straight Connector 10">
+            <a:extLst>
+              <a:ext uri="{FF2B5EF4-FFF2-40B4-BE49-F238E27FC236}">
+                <a16:creationId xmlns:a16="http://schemas.microsoft.com/office/drawing/2014/main" id="{10A5FDCF-25F0-4B06-9E9C-5E6C7AC06724}"/>
+              </a:ext>
+            </a:extLst>
+          </p:cNvPr>
+          <p:cNvCxnSpPr>
+            <a:cxnSpLocks/>
+          </p:cNvCxnSpPr>
+          <p:nvPr/>
+        </p:nvCxnSpPr>
+        <p:spPr>
+          <a:xfrm flipV="1">
+            <a:off x="2286000" y="3561271"/>
+            <a:ext cx="0" cy="531814"/>
+          </a:xfrm>
+          <a:prstGeom prst="line">
+            <a:avLst/>
+          </a:prstGeom>
+        </p:spPr>
+        <p:style>
+          <a:lnRef idx="1">
+            <a:schemeClr val="accent1"/>
+          </a:lnRef>
+          <a:fillRef idx="0">
+            <a:schemeClr val="accent1"/>
+          </a:fillRef>
+          <a:effectRef idx="0">
+            <a:schemeClr val="accent1"/>
+          </a:effectRef>
+          <a:fontRef idx="minor">
+            <a:schemeClr val="tx1"/>
+          </a:fontRef>
+        </p:style>
+      </p:cxnSp>
+      <p:cxnSp>
+        <p:nvCxnSpPr>
+          <p:cNvPr id="12" name="Straight Connector 11">
+            <a:extLst>
+              <a:ext uri="{FF2B5EF4-FFF2-40B4-BE49-F238E27FC236}">
+                <a16:creationId xmlns:a16="http://schemas.microsoft.com/office/drawing/2014/main" id="{4EFD3A43-239B-46DE-A248-C1C04A8E40F2}"/>
+              </a:ext>
+            </a:extLst>
+          </p:cNvPr>
+          <p:cNvCxnSpPr>
+            <a:cxnSpLocks/>
+          </p:cNvCxnSpPr>
+          <p:nvPr/>
+        </p:nvCxnSpPr>
+        <p:spPr>
+          <a:xfrm flipH="1">
+            <a:off x="2286000" y="3853654"/>
+            <a:ext cx="4305300" cy="0"/>
+          </a:xfrm>
+          <a:prstGeom prst="line">
+            <a:avLst/>
+          </a:prstGeom>
+        </p:spPr>
+        <p:style>
+          <a:lnRef idx="1">
+            <a:schemeClr val="accent1"/>
+          </a:lnRef>
+          <a:fillRef idx="0">
+            <a:schemeClr val="accent1"/>
+          </a:fillRef>
+          <a:effectRef idx="0">
+            <a:schemeClr val="accent1"/>
+          </a:effectRef>
+          <a:fontRef idx="minor">
+            <a:schemeClr val="tx1"/>
+          </a:fontRef>
+        </p:style>
+      </p:cxnSp>
+      <p:sp>
+        <p:nvSpPr>
+          <p:cNvPr id="13" name="TextBox 12">
+            <a:extLst>
+              <a:ext uri="{FF2B5EF4-FFF2-40B4-BE49-F238E27FC236}">
+                <a16:creationId xmlns:a16="http://schemas.microsoft.com/office/drawing/2014/main" id="{019D06E2-EC99-4E31-84A4-1C864B5A6C99}"/>
+              </a:ext>
+            </a:extLst>
+          </p:cNvPr>
+          <p:cNvSpPr txBox="1"/>
+          <p:nvPr/>
+        </p:nvSpPr>
+        <p:spPr>
+          <a:xfrm>
+            <a:off x="3140309" y="3654429"/>
+            <a:ext cx="753732" cy="369332"/>
+          </a:xfrm>
+          <a:prstGeom prst="rect">
+            <a:avLst/>
+          </a:prstGeom>
+          <a:solidFill>
+            <a:schemeClr val="bg1"/>
+          </a:solidFill>
+        </p:spPr>
+        <p:txBody>
+          <a:bodyPr wrap="none" rtlCol="0">
+            <a:spAutoFit/>
+          </a:bodyPr>
+          <a:lstStyle/>
+          <a:p>
+            <a:r>
+              <a:rPr lang="en-US" dirty="0">
+                <a:solidFill>
+                  <a:srgbClr val="0070C0"/>
+                </a:solidFill>
+              </a:rPr>
+              <a:t>30 cm</a:t>
+            </a:r>
+          </a:p>
+        </p:txBody>
+      </p:sp>
+      <p:cxnSp>
+        <p:nvCxnSpPr>
+          <p:cNvPr id="14" name="Straight Connector 13">
+            <a:extLst>
+              <a:ext uri="{FF2B5EF4-FFF2-40B4-BE49-F238E27FC236}">
+                <a16:creationId xmlns:a16="http://schemas.microsoft.com/office/drawing/2014/main" id="{6465AF3B-48AC-4C4D-AD38-8A2FC6792DEC}"/>
+              </a:ext>
+            </a:extLst>
+          </p:cNvPr>
+          <p:cNvCxnSpPr>
+            <a:cxnSpLocks/>
+          </p:cNvCxnSpPr>
+          <p:nvPr/>
+        </p:nvCxnSpPr>
+        <p:spPr>
+          <a:xfrm flipV="1">
+            <a:off x="6591300" y="3561271"/>
+            <a:ext cx="0" cy="531814"/>
+          </a:xfrm>
+          <a:prstGeom prst="line">
+            <a:avLst/>
+          </a:prstGeom>
+        </p:spPr>
+        <p:style>
+          <a:lnRef idx="1">
+            <a:schemeClr val="accent1"/>
+          </a:lnRef>
+          <a:fillRef idx="0">
+            <a:schemeClr val="accent1"/>
+          </a:fillRef>
+          <a:effectRef idx="0">
+            <a:schemeClr val="accent1"/>
+          </a:effectRef>
+          <a:fontRef idx="minor">
+            <a:schemeClr val="tx1"/>
+          </a:fontRef>
+        </p:style>
+      </p:cxnSp>
+      <p:cxnSp>
+        <p:nvCxnSpPr>
+          <p:cNvPr id="15" name="Straight Connector 14">
+            <a:extLst>
+              <a:ext uri="{FF2B5EF4-FFF2-40B4-BE49-F238E27FC236}">
+                <a16:creationId xmlns:a16="http://schemas.microsoft.com/office/drawing/2014/main" id="{3987A83C-3FFA-43EA-B24C-5DE81A7BD9F6}"/>
+              </a:ext>
+            </a:extLst>
+          </p:cNvPr>
+          <p:cNvCxnSpPr>
+            <a:cxnSpLocks/>
+          </p:cNvCxnSpPr>
+          <p:nvPr/>
+        </p:nvCxnSpPr>
+        <p:spPr>
+          <a:xfrm flipV="1">
+            <a:off x="4438650" y="3561271"/>
+            <a:ext cx="0" cy="531814"/>
+          </a:xfrm>
+          <a:prstGeom prst="line">
+            <a:avLst/>
+          </a:prstGeom>
+        </p:spPr>
+        <p:style>
+          <a:lnRef idx="1">
+            <a:schemeClr val="accent1"/>
+          </a:lnRef>
+          <a:fillRef idx="0">
+            <a:schemeClr val="accent1"/>
+          </a:fillRef>
+          <a:effectRef idx="0">
+            <a:schemeClr val="accent1"/>
+          </a:effectRef>
+          <a:fontRef idx="minor">
+            <a:schemeClr val="tx1"/>
+          </a:fontRef>
+        </p:style>
+      </p:cxnSp>
+      <p:sp>
+        <p:nvSpPr>
+          <p:cNvPr id="23" name="TextBox 22">
+            <a:extLst>
+              <a:ext uri="{FF2B5EF4-FFF2-40B4-BE49-F238E27FC236}">
+                <a16:creationId xmlns:a16="http://schemas.microsoft.com/office/drawing/2014/main" id="{F9B4592E-2D22-45EA-9B92-DF5E54028E7A}"/>
+              </a:ext>
+            </a:extLst>
+          </p:cNvPr>
+          <p:cNvSpPr txBox="1"/>
+          <p:nvPr/>
+        </p:nvSpPr>
+        <p:spPr>
+          <a:xfrm>
+            <a:off x="5102458" y="3681694"/>
+            <a:ext cx="753732" cy="369332"/>
+          </a:xfrm>
+          <a:prstGeom prst="rect">
+            <a:avLst/>
+          </a:prstGeom>
+          <a:solidFill>
+            <a:schemeClr val="bg1"/>
+          </a:solidFill>
+        </p:spPr>
+        <p:txBody>
+          <a:bodyPr wrap="none" rtlCol="0">
+            <a:spAutoFit/>
+          </a:bodyPr>
+          <a:lstStyle/>
+          <a:p>
+            <a:r>
+              <a:rPr lang="en-US" dirty="0">
+                <a:solidFill>
+                  <a:srgbClr val="0070C0"/>
+                </a:solidFill>
+              </a:rPr>
+              <a:t>30 cm</a:t>
+            </a:r>
+          </a:p>
+        </p:txBody>
+      </p:sp>
+      <p:cxnSp>
+        <p:nvCxnSpPr>
+          <p:cNvPr id="24" name="Straight Connector 23">
+            <a:extLst>
+              <a:ext uri="{FF2B5EF4-FFF2-40B4-BE49-F238E27FC236}">
+                <a16:creationId xmlns:a16="http://schemas.microsoft.com/office/drawing/2014/main" id="{C9C29C10-C260-4E55-8ADB-52F4EBFE88BF}"/>
+              </a:ext>
+            </a:extLst>
+          </p:cNvPr>
+          <p:cNvCxnSpPr>
+            <a:cxnSpLocks/>
+          </p:cNvCxnSpPr>
+          <p:nvPr/>
+        </p:nvCxnSpPr>
+        <p:spPr>
+          <a:xfrm flipV="1">
+            <a:off x="6553200" y="5495925"/>
+            <a:ext cx="0" cy="531814"/>
+          </a:xfrm>
+          <a:prstGeom prst="line">
+            <a:avLst/>
+          </a:prstGeom>
+        </p:spPr>
+        <p:style>
+          <a:lnRef idx="1">
+            <a:schemeClr val="accent1"/>
+          </a:lnRef>
+          <a:fillRef idx="0">
+            <a:schemeClr val="accent1"/>
+          </a:fillRef>
+          <a:effectRef idx="0">
+            <a:schemeClr val="accent1"/>
+          </a:effectRef>
+          <a:fontRef idx="minor">
+            <a:schemeClr val="tx1"/>
+          </a:fontRef>
+        </p:style>
+      </p:cxnSp>
+      <p:cxnSp>
+        <p:nvCxnSpPr>
+          <p:cNvPr id="26" name="Straight Connector 25">
+            <a:extLst>
+              <a:ext uri="{FF2B5EF4-FFF2-40B4-BE49-F238E27FC236}">
+                <a16:creationId xmlns:a16="http://schemas.microsoft.com/office/drawing/2014/main" id="{63490474-1FE2-4039-A592-B5F289821377}"/>
+              </a:ext>
+            </a:extLst>
+          </p:cNvPr>
+          <p:cNvCxnSpPr>
+            <a:cxnSpLocks/>
+          </p:cNvCxnSpPr>
+          <p:nvPr/>
+        </p:nvCxnSpPr>
+        <p:spPr>
+          <a:xfrm flipV="1">
+            <a:off x="8077200" y="4093085"/>
+            <a:ext cx="0" cy="531814"/>
+          </a:xfrm>
+          <a:prstGeom prst="line">
+            <a:avLst/>
+          </a:prstGeom>
+        </p:spPr>
+        <p:style>
+          <a:lnRef idx="1">
+            <a:schemeClr val="accent1"/>
+          </a:lnRef>
+          <a:fillRef idx="0">
+            <a:schemeClr val="accent1"/>
+          </a:fillRef>
+          <a:effectRef idx="0">
+            <a:schemeClr val="accent1"/>
+          </a:effectRef>
+          <a:fontRef idx="minor">
+            <a:schemeClr val="tx1"/>
+          </a:fontRef>
+        </p:style>
+      </p:cxnSp>
+      <p:cxnSp>
+        <p:nvCxnSpPr>
+          <p:cNvPr id="27" name="Straight Connector 26">
+            <a:extLst>
+              <a:ext uri="{FF2B5EF4-FFF2-40B4-BE49-F238E27FC236}">
+                <a16:creationId xmlns:a16="http://schemas.microsoft.com/office/drawing/2014/main" id="{F29EA064-FBFD-4B8E-A726-E55A28EE193A}"/>
+              </a:ext>
+            </a:extLst>
+          </p:cNvPr>
+          <p:cNvCxnSpPr>
+            <a:cxnSpLocks/>
+          </p:cNvCxnSpPr>
+          <p:nvPr/>
+        </p:nvCxnSpPr>
+        <p:spPr>
+          <a:xfrm flipH="1">
+            <a:off x="6553199" y="4343370"/>
+            <a:ext cx="1524001" cy="1453384"/>
+          </a:xfrm>
+          <a:prstGeom prst="line">
+            <a:avLst/>
+          </a:prstGeom>
+        </p:spPr>
+        <p:style>
+          <a:lnRef idx="1">
+            <a:schemeClr val="accent1"/>
+          </a:lnRef>
+          <a:fillRef idx="0">
+            <a:schemeClr val="accent1"/>
+          </a:fillRef>
+          <a:effectRef idx="0">
+            <a:schemeClr val="accent1"/>
+          </a:effectRef>
+          <a:fontRef idx="minor">
+            <a:schemeClr val="tx1"/>
+          </a:fontRef>
+        </p:style>
+      </p:cxnSp>
+      <p:sp>
+        <p:nvSpPr>
+          <p:cNvPr id="31" name="TextBox 30">
+            <a:extLst>
+              <a:ext uri="{FF2B5EF4-FFF2-40B4-BE49-F238E27FC236}">
+                <a16:creationId xmlns:a16="http://schemas.microsoft.com/office/drawing/2014/main" id="{6EA73485-ADD2-4A09-99F7-6E90FFE0212F}"/>
+              </a:ext>
+            </a:extLst>
+          </p:cNvPr>
+          <p:cNvSpPr txBox="1"/>
+          <p:nvPr/>
+        </p:nvSpPr>
+        <p:spPr>
+          <a:xfrm>
+            <a:off x="7128206" y="4870728"/>
+            <a:ext cx="753732" cy="369332"/>
+          </a:xfrm>
+          <a:prstGeom prst="rect">
+            <a:avLst/>
+          </a:prstGeom>
+          <a:solidFill>
+            <a:schemeClr val="bg1"/>
+          </a:solidFill>
+        </p:spPr>
+        <p:txBody>
+          <a:bodyPr wrap="none" rtlCol="0">
+            <a:spAutoFit/>
+          </a:bodyPr>
+          <a:lstStyle/>
+          <a:p>
+            <a:r>
+              <a:rPr lang="en-US" dirty="0">
+                <a:solidFill>
+                  <a:srgbClr val="0070C0"/>
+                </a:solidFill>
+              </a:rPr>
+              <a:t>25 cm</a:t>
+            </a:r>
+          </a:p>
+        </p:txBody>
+      </p:sp>
+      <p:cxnSp>
+        <p:nvCxnSpPr>
+          <p:cNvPr id="32" name="Straight Connector 31">
+            <a:extLst>
+              <a:ext uri="{FF2B5EF4-FFF2-40B4-BE49-F238E27FC236}">
+                <a16:creationId xmlns:a16="http://schemas.microsoft.com/office/drawing/2014/main" id="{2EC85D09-F8E2-42A0-9681-AF2CD8590705}"/>
+              </a:ext>
+            </a:extLst>
+          </p:cNvPr>
+          <p:cNvCxnSpPr>
+            <a:cxnSpLocks/>
+          </p:cNvCxnSpPr>
+          <p:nvPr/>
+        </p:nvCxnSpPr>
+        <p:spPr>
+          <a:xfrm flipV="1">
+            <a:off x="914400" y="4824403"/>
+            <a:ext cx="0" cy="531814"/>
+          </a:xfrm>
+          <a:prstGeom prst="line">
+            <a:avLst/>
+          </a:prstGeom>
+        </p:spPr>
+        <p:style>
+          <a:lnRef idx="1">
+            <a:schemeClr val="accent1"/>
+          </a:lnRef>
+          <a:fillRef idx="0">
+            <a:schemeClr val="accent1"/>
+          </a:fillRef>
+          <a:effectRef idx="0">
+            <a:schemeClr val="accent1"/>
+          </a:effectRef>
+          <a:fontRef idx="minor">
+            <a:schemeClr val="tx1"/>
+          </a:fontRef>
+        </p:style>
+      </p:cxnSp>
+      <p:cxnSp>
+        <p:nvCxnSpPr>
+          <p:cNvPr id="33" name="Straight Connector 32">
+            <a:extLst>
+              <a:ext uri="{FF2B5EF4-FFF2-40B4-BE49-F238E27FC236}">
+                <a16:creationId xmlns:a16="http://schemas.microsoft.com/office/drawing/2014/main" id="{7977019E-2E9C-4930-90DB-A98C5A1CD14D}"/>
+              </a:ext>
+            </a:extLst>
+          </p:cNvPr>
+          <p:cNvCxnSpPr>
+            <a:cxnSpLocks/>
+          </p:cNvCxnSpPr>
+          <p:nvPr/>
+        </p:nvCxnSpPr>
+        <p:spPr>
+          <a:xfrm flipV="1">
+            <a:off x="914399" y="3786976"/>
+            <a:ext cx="1352551" cy="1303335"/>
+          </a:xfrm>
+          <a:prstGeom prst="line">
+            <a:avLst/>
+          </a:prstGeom>
+        </p:spPr>
+        <p:style>
+          <a:lnRef idx="1">
+            <a:schemeClr val="accent1"/>
+          </a:lnRef>
+          <a:fillRef idx="0">
+            <a:schemeClr val="accent1"/>
+          </a:fillRef>
+          <a:effectRef idx="0">
+            <a:schemeClr val="accent1"/>
+          </a:effectRef>
+          <a:fontRef idx="minor">
+            <a:schemeClr val="tx1"/>
+          </a:fontRef>
+        </p:style>
+      </p:cxnSp>
+      <p:sp>
+        <p:nvSpPr>
+          <p:cNvPr id="36" name="TextBox 35">
+            <a:extLst>
+              <a:ext uri="{FF2B5EF4-FFF2-40B4-BE49-F238E27FC236}">
+                <a16:creationId xmlns:a16="http://schemas.microsoft.com/office/drawing/2014/main" id="{9E84FB59-E9E7-455D-AB65-AD376D9FFA32}"/>
+              </a:ext>
+            </a:extLst>
+          </p:cNvPr>
+          <p:cNvSpPr txBox="1"/>
+          <p:nvPr/>
+        </p:nvSpPr>
+        <p:spPr>
+          <a:xfrm>
+            <a:off x="1114425" y="4124325"/>
+            <a:ext cx="753732" cy="369332"/>
+          </a:xfrm>
+          <a:prstGeom prst="rect">
+            <a:avLst/>
+          </a:prstGeom>
+          <a:solidFill>
+            <a:schemeClr val="bg1"/>
+          </a:solidFill>
+        </p:spPr>
+        <p:txBody>
+          <a:bodyPr wrap="none" rtlCol="0">
+            <a:spAutoFit/>
+          </a:bodyPr>
+          <a:lstStyle/>
+          <a:p>
+            <a:r>
+              <a:rPr lang="en-US" dirty="0">
+                <a:solidFill>
+                  <a:srgbClr val="0070C0"/>
+                </a:solidFill>
+              </a:rPr>
+              <a:t>25 cm</a:t>
+            </a:r>
+          </a:p>
+        </p:txBody>
+      </p:sp>
+      <p:sp>
+        <p:nvSpPr>
+          <p:cNvPr id="38" name="TextBox 37">
+            <a:extLst>
+              <a:ext uri="{FF2B5EF4-FFF2-40B4-BE49-F238E27FC236}">
+                <a16:creationId xmlns:a16="http://schemas.microsoft.com/office/drawing/2014/main" id="{2E5547B7-327D-4F42-85AE-6D2606EBA05E}"/>
+              </a:ext>
+            </a:extLst>
+          </p:cNvPr>
+          <p:cNvSpPr txBox="1"/>
+          <p:nvPr/>
+        </p:nvSpPr>
+        <p:spPr>
+          <a:xfrm>
+            <a:off x="6100682" y="4572747"/>
+            <a:ext cx="327334" cy="369332"/>
+          </a:xfrm>
+          <a:prstGeom prst="rect">
+            <a:avLst/>
+          </a:prstGeom>
+          <a:noFill/>
+        </p:spPr>
+        <p:txBody>
+          <a:bodyPr wrap="none" rtlCol="0">
+            <a:spAutoFit/>
+          </a:bodyPr>
+          <a:lstStyle/>
+          <a:p>
+            <a:r>
+              <a:rPr lang="en-US" dirty="0"/>
+              <a:t>D</a:t>
+            </a:r>
+          </a:p>
+        </p:txBody>
+      </p:sp>
+      <p:sp>
+        <p:nvSpPr>
+          <p:cNvPr id="39" name="TextBox 38">
+            <a:extLst>
+              <a:ext uri="{FF2B5EF4-FFF2-40B4-BE49-F238E27FC236}">
+                <a16:creationId xmlns:a16="http://schemas.microsoft.com/office/drawing/2014/main" id="{68D3DFB9-AC39-4FF7-9716-8E87226405BE}"/>
+              </a:ext>
+            </a:extLst>
+          </p:cNvPr>
+          <p:cNvSpPr txBox="1"/>
+          <p:nvPr/>
+        </p:nvSpPr>
+        <p:spPr>
+          <a:xfrm>
+            <a:off x="8064193" y="3252523"/>
+            <a:ext cx="296876" cy="369332"/>
+          </a:xfrm>
+          <a:prstGeom prst="rect">
+            <a:avLst/>
+          </a:prstGeom>
+          <a:noFill/>
+        </p:spPr>
+        <p:txBody>
+          <a:bodyPr wrap="none" rtlCol="0">
+            <a:spAutoFit/>
+          </a:bodyPr>
+          <a:lstStyle/>
+          <a:p>
+            <a:r>
+              <a:rPr lang="en-US" dirty="0"/>
+              <a:t>E</a:t>
+            </a:r>
+          </a:p>
+        </p:txBody>
+      </p:sp>
+      <p:cxnSp>
+        <p:nvCxnSpPr>
+          <p:cNvPr id="40" name="Straight Arrow Connector 39">
+            <a:extLst>
+              <a:ext uri="{FF2B5EF4-FFF2-40B4-BE49-F238E27FC236}">
+                <a16:creationId xmlns:a16="http://schemas.microsoft.com/office/drawing/2014/main" id="{09ADD034-B723-45D0-818E-A2C709C486AA}"/>
+              </a:ext>
+            </a:extLst>
+          </p:cNvPr>
+          <p:cNvCxnSpPr>
+            <a:cxnSpLocks/>
+          </p:cNvCxnSpPr>
+          <p:nvPr/>
+        </p:nvCxnSpPr>
+        <p:spPr>
+          <a:xfrm>
+            <a:off x="4448175" y="4772819"/>
+            <a:ext cx="0" cy="865981"/>
+          </a:xfrm>
+          <a:prstGeom prst="straightConnector1">
+            <a:avLst/>
+          </a:prstGeom>
+          <a:ln>
+            <a:solidFill>
+              <a:srgbClr val="FF0000"/>
+            </a:solidFill>
+            <a:tailEnd type="triangle"/>
+          </a:ln>
+        </p:spPr>
+        <p:style>
+          <a:lnRef idx="3">
+            <a:schemeClr val="accent2"/>
+          </a:lnRef>
+          <a:fillRef idx="0">
+            <a:schemeClr val="accent2"/>
+          </a:fillRef>
+          <a:effectRef idx="2">
+            <a:schemeClr val="accent2"/>
+          </a:effectRef>
+          <a:fontRef idx="minor">
+            <a:schemeClr val="tx1"/>
+          </a:fontRef>
+        </p:style>
+      </p:cxnSp>
+      <p:sp>
+        <p:nvSpPr>
+          <p:cNvPr id="41" name="TextBox 40">
+            <a:extLst>
+              <a:ext uri="{FF2B5EF4-FFF2-40B4-BE49-F238E27FC236}">
+                <a16:creationId xmlns:a16="http://schemas.microsoft.com/office/drawing/2014/main" id="{D8AA4461-2344-4AE7-8CE8-9A731B0BAF89}"/>
+              </a:ext>
+            </a:extLst>
+          </p:cNvPr>
+          <p:cNvSpPr txBox="1"/>
+          <p:nvPr/>
+        </p:nvSpPr>
+        <p:spPr>
+          <a:xfrm>
+            <a:off x="4079324" y="5761832"/>
+            <a:ext cx="737702" cy="369332"/>
+          </a:xfrm>
+          <a:prstGeom prst="rect">
+            <a:avLst/>
+          </a:prstGeom>
+          <a:noFill/>
+        </p:spPr>
+        <p:txBody>
+          <a:bodyPr wrap="none" rtlCol="0">
+            <a:spAutoFit/>
+          </a:bodyPr>
+          <a:lstStyle/>
+          <a:p>
+            <a:r>
+              <a:rPr lang="en-US" dirty="0">
+                <a:solidFill>
+                  <a:srgbClr val="FF0000"/>
+                </a:solidFill>
+              </a:rPr>
+              <a:t>700 N</a:t>
+            </a:r>
+          </a:p>
+        </p:txBody>
+      </p:sp>
+      <p:cxnSp>
+        <p:nvCxnSpPr>
+          <p:cNvPr id="45" name="Straight Arrow Connector 44">
+            <a:extLst>
+              <a:ext uri="{FF2B5EF4-FFF2-40B4-BE49-F238E27FC236}">
+                <a16:creationId xmlns:a16="http://schemas.microsoft.com/office/drawing/2014/main" id="{D444A0ED-2BF7-4D18-B180-C33A5EB8EF41}"/>
+              </a:ext>
+            </a:extLst>
+          </p:cNvPr>
+          <p:cNvCxnSpPr>
+            <a:cxnSpLocks/>
+          </p:cNvCxnSpPr>
+          <p:nvPr/>
+        </p:nvCxnSpPr>
+        <p:spPr>
+          <a:xfrm flipV="1">
+            <a:off x="914399" y="5305424"/>
+            <a:ext cx="0" cy="734220"/>
+          </a:xfrm>
+          <a:prstGeom prst="straightConnector1">
+            <a:avLst/>
+          </a:prstGeom>
+          <a:ln>
+            <a:solidFill>
+              <a:srgbClr val="FF0000"/>
+            </a:solidFill>
+            <a:tailEnd type="triangle"/>
+          </a:ln>
+        </p:spPr>
+        <p:style>
+          <a:lnRef idx="3">
+            <a:schemeClr val="accent2"/>
+          </a:lnRef>
+          <a:fillRef idx="0">
+            <a:schemeClr val="accent2"/>
+          </a:fillRef>
+          <a:effectRef idx="2">
+            <a:schemeClr val="accent2"/>
+          </a:effectRef>
+          <a:fontRef idx="minor">
+            <a:schemeClr val="tx1"/>
+          </a:fontRef>
+        </p:style>
+      </p:cxnSp>
+      <p:cxnSp>
+        <p:nvCxnSpPr>
+          <p:cNvPr id="47" name="Straight Arrow Connector 46">
+            <a:extLst>
+              <a:ext uri="{FF2B5EF4-FFF2-40B4-BE49-F238E27FC236}">
+                <a16:creationId xmlns:a16="http://schemas.microsoft.com/office/drawing/2014/main" id="{07525262-733B-471F-889D-BD122C7978CF}"/>
+              </a:ext>
+            </a:extLst>
+          </p:cNvPr>
+          <p:cNvCxnSpPr>
+            <a:cxnSpLocks/>
+          </p:cNvCxnSpPr>
+          <p:nvPr/>
+        </p:nvCxnSpPr>
+        <p:spPr>
+          <a:xfrm flipV="1">
+            <a:off x="7920038" y="2667000"/>
+            <a:ext cx="0" cy="304800"/>
+          </a:xfrm>
+          <a:prstGeom prst="straightConnector1">
+            <a:avLst/>
+          </a:prstGeom>
+          <a:ln>
+            <a:solidFill>
+              <a:srgbClr val="FF0000"/>
+            </a:solidFill>
+            <a:tailEnd type="triangle"/>
+          </a:ln>
+        </p:spPr>
+        <p:style>
+          <a:lnRef idx="3">
+            <a:schemeClr val="accent2"/>
+          </a:lnRef>
+          <a:fillRef idx="0">
+            <a:schemeClr val="accent2"/>
+          </a:fillRef>
+          <a:effectRef idx="2">
+            <a:schemeClr val="accent2"/>
+          </a:effectRef>
+          <a:fontRef idx="minor">
+            <a:schemeClr val="tx1"/>
+          </a:fontRef>
+        </p:style>
+      </p:cxnSp>
+      <p:cxnSp>
+        <p:nvCxnSpPr>
+          <p:cNvPr id="49" name="Straight Arrow Connector 48">
+            <a:extLst>
+              <a:ext uri="{FF2B5EF4-FFF2-40B4-BE49-F238E27FC236}">
+                <a16:creationId xmlns:a16="http://schemas.microsoft.com/office/drawing/2014/main" id="{03FA30BF-562B-43B0-AE68-8C3138215C4A}"/>
+              </a:ext>
+            </a:extLst>
+          </p:cNvPr>
+          <p:cNvCxnSpPr>
+            <a:cxnSpLocks/>
+          </p:cNvCxnSpPr>
+          <p:nvPr/>
+        </p:nvCxnSpPr>
+        <p:spPr>
+          <a:xfrm flipH="1" flipV="1">
+            <a:off x="7924800" y="2995877"/>
+            <a:ext cx="4762" cy="433123"/>
+          </a:xfrm>
+          <a:prstGeom prst="straightConnector1">
+            <a:avLst/>
+          </a:prstGeom>
+          <a:ln>
+            <a:solidFill>
+              <a:srgbClr val="FF0000"/>
+            </a:solidFill>
+            <a:prstDash val="sysDash"/>
+            <a:headEnd type="none" w="med" len="med"/>
+            <a:tailEnd type="none" w="med" len="med"/>
+          </a:ln>
+        </p:spPr>
+        <p:style>
+          <a:lnRef idx="3">
+            <a:schemeClr val="accent2"/>
+          </a:lnRef>
+          <a:fillRef idx="0">
+            <a:schemeClr val="accent2"/>
+          </a:fillRef>
+          <a:effectRef idx="2">
+            <a:schemeClr val="accent2"/>
+          </a:effectRef>
+          <a:fontRef idx="minor">
+            <a:schemeClr val="tx1"/>
+          </a:fontRef>
+        </p:style>
+      </p:cxnSp>
+      <p:sp>
+        <p:nvSpPr>
+          <p:cNvPr id="51" name="TextBox 50">
+            <a:extLst>
+              <a:ext uri="{FF2B5EF4-FFF2-40B4-BE49-F238E27FC236}">
+                <a16:creationId xmlns:a16="http://schemas.microsoft.com/office/drawing/2014/main" id="{907CF984-5761-4668-91C7-88F3F1D1B9BA}"/>
+              </a:ext>
+            </a:extLst>
+          </p:cNvPr>
+          <p:cNvSpPr txBox="1"/>
+          <p:nvPr/>
+        </p:nvSpPr>
+        <p:spPr>
+          <a:xfrm>
+            <a:off x="120459" y="4974189"/>
+            <a:ext cx="737702" cy="369332"/>
+          </a:xfrm>
+          <a:prstGeom prst="rect">
+            <a:avLst/>
+          </a:prstGeom>
+          <a:noFill/>
+        </p:spPr>
+        <p:txBody>
+          <a:bodyPr wrap="none" rtlCol="0">
+            <a:spAutoFit/>
+          </a:bodyPr>
+          <a:lstStyle/>
+          <a:p>
+            <a:r>
+              <a:rPr lang="en-US" dirty="0">
+                <a:solidFill>
+                  <a:srgbClr val="FF0000"/>
+                </a:solidFill>
+              </a:rPr>
+              <a:t>350 N</a:t>
+            </a:r>
+          </a:p>
+        </p:txBody>
+      </p:sp>
+      <p:sp>
+        <p:nvSpPr>
+          <p:cNvPr id="52" name="TextBox 51">
+            <a:extLst>
+              <a:ext uri="{FF2B5EF4-FFF2-40B4-BE49-F238E27FC236}">
+                <a16:creationId xmlns:a16="http://schemas.microsoft.com/office/drawing/2014/main" id="{DA2E0D6B-BE5A-4558-BADD-B2F903A4A6C9}"/>
+              </a:ext>
+            </a:extLst>
+          </p:cNvPr>
+          <p:cNvSpPr txBox="1"/>
+          <p:nvPr/>
+        </p:nvSpPr>
+        <p:spPr>
+          <a:xfrm>
+            <a:off x="7558330" y="2288299"/>
+            <a:ext cx="737702" cy="369332"/>
+          </a:xfrm>
+          <a:prstGeom prst="rect">
+            <a:avLst/>
+          </a:prstGeom>
+          <a:noFill/>
+        </p:spPr>
+        <p:txBody>
+          <a:bodyPr wrap="none" rtlCol="0">
+            <a:spAutoFit/>
+          </a:bodyPr>
+          <a:lstStyle/>
+          <a:p>
+            <a:r>
+              <a:rPr lang="en-US" dirty="0">
+                <a:solidFill>
+                  <a:srgbClr val="FF0000"/>
+                </a:solidFill>
+              </a:rPr>
+              <a:t>350 N</a:t>
+            </a:r>
+          </a:p>
+        </p:txBody>
+      </p:sp>
+      <p:sp>
+        <p:nvSpPr>
+          <p:cNvPr id="53" name="TextBox 52">
+            <a:extLst>
+              <a:ext uri="{FF2B5EF4-FFF2-40B4-BE49-F238E27FC236}">
+                <a16:creationId xmlns:a16="http://schemas.microsoft.com/office/drawing/2014/main" id="{26F19425-2157-4FE4-83E4-8CAFC10E213C}"/>
+              </a:ext>
+            </a:extLst>
+          </p:cNvPr>
+          <p:cNvSpPr txBox="1"/>
+          <p:nvPr/>
+        </p:nvSpPr>
+        <p:spPr>
+          <a:xfrm>
+            <a:off x="4294126" y="4354510"/>
+            <a:ext cx="308098" cy="369332"/>
+          </a:xfrm>
+          <a:prstGeom prst="rect">
+            <a:avLst/>
+          </a:prstGeom>
+          <a:noFill/>
+        </p:spPr>
+        <p:txBody>
+          <a:bodyPr wrap="none" rtlCol="0">
+            <a:spAutoFit/>
+          </a:bodyPr>
+          <a:lstStyle/>
+          <a:p>
+            <a:r>
+              <a:rPr lang="en-US" dirty="0"/>
+              <a:t>C</a:t>
+            </a:r>
+          </a:p>
+        </p:txBody>
+      </p:sp>
+    </p:spTree>
+    <p:extLst>
+      <p:ext uri="{BB962C8B-B14F-4D97-AF65-F5344CB8AC3E}">
+        <p14:creationId xmlns:p14="http://schemas.microsoft.com/office/powerpoint/2010/main" val="2630629756"/>
       </p:ext>
     </p:extLst>
   </p:cSld>
@@ -15197,21 +17525,6 @@
 </file>
 
 <file path=customXml/item1.xml><?xml version="1.0" encoding="utf-8"?>
-<?mso-contentType ?>
-<FormTemplates xmlns="http://schemas.microsoft.com/sharepoint/v3/contenttype/forms">
-  <Display>DocumentLibraryForm</Display>
-  <Edit>DocumentLibraryForm</Edit>
-  <New>DocumentLibraryForm</New>
-</FormTemplates>
-</file>
-
-<file path=customXml/item2.xml><?xml version="1.0" encoding="utf-8"?>
-<p:properties xmlns:p="http://schemas.microsoft.com/office/2006/metadata/properties" xmlns:xsi="http://www.w3.org/2001/XMLSchema-instance" xmlns:pc="http://schemas.microsoft.com/office/infopath/2007/PartnerControls">
-  <documentManagement/>
-</p:properties>
-</file>
-
-<file path=customXml/item3.xml><?xml version="1.0" encoding="utf-8"?>
 <ct:contentTypeSchema xmlns:ct="http://schemas.microsoft.com/office/2006/metadata/contentType" xmlns:ma="http://schemas.microsoft.com/office/2006/metadata/properties/metaAttributes" ct:_="" ma:_="" ma:contentTypeName="Document" ma:contentTypeID="0x010100A06DF21F5BB2734A800ED30F3F452129" ma:contentTypeVersion="12" ma:contentTypeDescription="Create a new document." ma:contentTypeScope="" ma:versionID="544d96a5fbac5de9d5d902b535c73fb2">
   <xsd:schema xmlns:xsd="http://www.w3.org/2001/XMLSchema" xmlns:xs="http://www.w3.org/2001/XMLSchema" xmlns:p="http://schemas.microsoft.com/office/2006/metadata/properties" xmlns:ns3="90d05cb5-950f-4f68-bc2c-e17794455b92" xmlns:ns4="b4eab9fa-dbb0-4082-8491-8bd54207a265" targetNamespace="http://schemas.microsoft.com/office/2006/metadata/properties" ma:root="true" ma:fieldsID="7a710efc71c2169bf9c05e5a40dddf12" ns3:_="" ns4:_="">
     <xsd:import namespace="90d05cb5-950f-4f68-bc2c-e17794455b92"/>
@@ -15428,24 +17741,22 @@
 </ct:contentTypeSchema>
 </file>
 
-<file path=customXml/itemProps1.xml><?xml version="1.0" encoding="utf-8"?>
-<ds:datastoreItem xmlns:ds="http://schemas.openxmlformats.org/officeDocument/2006/customXml" ds:itemID="{F5CF5F32-56DC-4068-8B04-457CF34A96F3}">
-  <ds:schemaRefs>
-    <ds:schemaRef ds:uri="http://schemas.microsoft.com/sharepoint/v3/contenttype/forms"/>
-  </ds:schemaRefs>
-</ds:datastoreItem>
+<file path=customXml/item2.xml><?xml version="1.0" encoding="utf-8"?>
+<p:properties xmlns:p="http://schemas.microsoft.com/office/2006/metadata/properties" xmlns:xsi="http://www.w3.org/2001/XMLSchema-instance" xmlns:pc="http://schemas.microsoft.com/office/infopath/2007/PartnerControls">
+  <documentManagement/>
+</p:properties>
 </file>
 
-<file path=customXml/itemProps2.xml><?xml version="1.0" encoding="utf-8"?>
-<ds:datastoreItem xmlns:ds="http://schemas.openxmlformats.org/officeDocument/2006/customXml" ds:itemID="{52EB1464-66D1-425A-BBB5-7A9312BBE9C4}">
-  <ds:schemaRefs>
-    <ds:schemaRef ds:uri="http://schemas.microsoft.com/office/2006/metadata/properties"/>
-    <ds:schemaRef ds:uri="http://schemas.microsoft.com/office/infopath/2007/PartnerControls"/>
-  </ds:schemaRefs>
-</ds:datastoreItem>
+<file path=customXml/item3.xml><?xml version="1.0" encoding="utf-8"?>
+<?mso-contentType ?>
+<FormTemplates xmlns="http://schemas.microsoft.com/sharepoint/v3/contenttype/forms">
+  <Display>DocumentLibraryForm</Display>
+  <Edit>DocumentLibraryForm</Edit>
+  <New>DocumentLibraryForm</New>
+</FormTemplates>
 </file>
 
-<file path=customXml/itemProps3.xml><?xml version="1.0" encoding="utf-8"?>
+<file path=customXml/itemProps1.xml><?xml version="1.0" encoding="utf-8"?>
 <ds:datastoreItem xmlns:ds="http://schemas.openxmlformats.org/officeDocument/2006/customXml" ds:itemID="{A43B8A4B-79FE-4529-931C-D64224FA70E3}">
   <ds:schemaRefs>
     <ds:schemaRef ds:uri="http://schemas.microsoft.com/office/2006/metadata/contentType"/>
@@ -15462,4 +17773,21 @@
     <ds:schemaRef ds:uri="http://schemas.microsoft.com/internal/obd"/>
   </ds:schemaRefs>
 </ds:datastoreItem>
+</file>
+
+<file path=customXml/itemProps2.xml><?xml version="1.0" encoding="utf-8"?>
+<ds:datastoreItem xmlns:ds="http://schemas.openxmlformats.org/officeDocument/2006/customXml" ds:itemID="{52EB1464-66D1-425A-BBB5-7A9312BBE9C4}">
+  <ds:schemaRefs>
+    <ds:schemaRef ds:uri="http://schemas.microsoft.com/office/2006/metadata/properties"/>
+    <ds:schemaRef ds:uri="http://schemas.microsoft.com/office/infopath/2007/PartnerControls"/>
+  </ds:schemaRefs>
+</ds:datastoreItem>
+</file>
+
+<file path=customXml/itemProps3.xml><?xml version="1.0" encoding="utf-8"?>
+<ds:datastoreItem xmlns:ds="http://schemas.openxmlformats.org/officeDocument/2006/customXml" ds:itemID="{F5CF5F32-56DC-4068-8B04-457CF34A96F3}">
+  <ds:schemaRefs>
+    <ds:schemaRef ds:uri="http://schemas.microsoft.com/sharepoint/v3/contenttype/forms"/>
+  </ds:schemaRefs>
+</ds:datastoreItem>
 </file>
</xml_diff>